<commit_message>
Added time width features
</commit_message>
<xml_diff>
--- a/poster/21P78Poster.pptx
+++ b/poster/21P78Poster.pptx
@@ -121,18 +121,6 @@
     </p:ext>
   </p:extLst>
 </p:presentation>
-</file>
-
-<file path=ppt/commentAuthors.xml><?xml version="1.0" encoding="utf-8"?>
-<p:cmAuthorLst xmlns:a="http://schemas.openxmlformats.org/drawingml/2006/main" xmlns:r="http://schemas.openxmlformats.org/officeDocument/2006/relationships" xmlns:p="http://schemas.openxmlformats.org/presentationml/2006/main">
-  <p:cmAuthor id="1" name="Basheq Tarifi" initials="BT" lastIdx="2" clrIdx="0">
-    <p:extLst>
-      <p:ext uri="{19B8F6BF-5375-455C-9EA6-DF929625EA0E}">
-        <p15:presenceInfo xmlns:p15="http://schemas.microsoft.com/office/powerpoint/2012/main" userId="Basheq Tarifi" providerId="None"/>
-      </p:ext>
-    </p:extLst>
-  </p:cmAuthor>
-</p:cmAuthorLst>
 </file>
 
 <file path=ppt/revisionInfo.xml><?xml version="1.0" encoding="utf-8"?>
@@ -322,29 +310,6 @@
     </pc:docChg>
   </pc:docChgLst>
 </pc:chgInfo>
-</file>
-
-<file path=ppt/comments/comment1.xml><?xml version="1.0" encoding="utf-8"?>
-<p:cmLst xmlns:a="http://schemas.openxmlformats.org/drawingml/2006/main" xmlns:r="http://schemas.openxmlformats.org/officeDocument/2006/relationships" xmlns:p="http://schemas.openxmlformats.org/presentationml/2006/main">
-  <p:cm authorId="1" dt="2021-10-19T08:27:57.816" idx="1">
-    <p:pos x="1929" y="3887"/>
-    <p:text>Should we add stuff about our target?</p:text>
-    <p:extLst>
-      <p:ext uri="{C676402C-5697-4E1C-873F-D02D1690AC5C}">
-        <p15:threadingInfo xmlns:p15="http://schemas.microsoft.com/office/powerpoint/2012/main" timeZoneBias="-120"/>
-      </p:ext>
-    </p:extLst>
-  </p:cm>
-  <p:cm authorId="1" dt="2021-10-19T08:28:31.702" idx="2">
-    <p:pos x="3380" y="2710"/>
-    <p:text>Maybe good to have this here also?</p:text>
-    <p:extLst>
-      <p:ext uri="{C676402C-5697-4E1C-873F-D02D1690AC5C}">
-        <p15:threadingInfo xmlns:p15="http://schemas.microsoft.com/office/powerpoint/2012/main" timeZoneBias="-120"/>
-      </p:ext>
-    </p:extLst>
-  </p:cm>
-</p:cmLst>
 </file>
 
 <file path=ppt/slideLayouts/slideLayout1.xml><?xml version="1.0" encoding="utf-8"?>
@@ -4184,10 +4149,10 @@
       </p:cxnSp>
       <p:sp>
         <p:nvSpPr>
-          <p:cNvPr id="49" name="テキスト ボックス 17">
-            <a:extLst>
-              <a:ext uri="{FF2B5EF4-FFF2-40B4-BE49-F238E27FC236}">
-                <a16:creationId xmlns:a16="http://schemas.microsoft.com/office/drawing/2014/main" id="{E4C0D7A8-1AE2-374C-9829-861A9C675F6F}"/>
+          <p:cNvPr id="15" name="TextBox 14">
+            <a:extLst>
+              <a:ext uri="{FF2B5EF4-FFF2-40B4-BE49-F238E27FC236}">
+                <a16:creationId xmlns:a16="http://schemas.microsoft.com/office/drawing/2014/main" id="{03F69A44-084B-6D4D-BB25-BF535E246618}"/>
               </a:ext>
             </a:extLst>
           </p:cNvPr>
@@ -4196,101 +4161,8 @@
         </p:nvSpPr>
         <p:spPr>
           <a:xfrm>
-            <a:off x="8263639" y="3485223"/>
-            <a:ext cx="3742624" cy="369332"/>
-          </a:xfrm>
-          <a:prstGeom prst="rect">
-            <a:avLst/>
-          </a:prstGeom>
-          <a:noFill/>
-        </p:spPr>
-        <p:txBody>
-          <a:bodyPr wrap="square" rtlCol="0">
-            <a:spAutoFit/>
-          </a:bodyPr>
-          <a:lstStyle/>
-          <a:p>
-            <a:pPr algn="ctr"/>
-            <a:r>
-              <a:rPr lang="en-US" altLang="ja-JP" b="1" dirty="0">
-                <a:latin typeface="Arial" panose="020B0604020202020204" pitchFamily="34" charset="0"/>
-                <a:cs typeface="Arial" panose="020B0604020202020204" pitchFamily="34" charset="0"/>
-              </a:rPr>
-              <a:t>5</a:t>
-            </a:r>
-            <a:r>
-              <a:rPr kumimoji="1" lang="en-US" altLang="ja-JP" b="1" dirty="0">
-                <a:latin typeface="Arial" panose="020B0604020202020204" pitchFamily="34" charset="0"/>
-                <a:cs typeface="Arial" panose="020B0604020202020204" pitchFamily="34" charset="0"/>
-              </a:rPr>
-              <a:t>. CONCLUSION</a:t>
-            </a:r>
-            <a:endParaRPr kumimoji="1" lang="ja-JP" altLang="en-US" b="1" dirty="0">
-              <a:latin typeface="Arial" panose="020B0604020202020204" pitchFamily="34" charset="0"/>
-              <a:cs typeface="Arial" panose="020B0604020202020204" pitchFamily="34" charset="0"/>
-            </a:endParaRPr>
-          </a:p>
-        </p:txBody>
-      </p:sp>
-      <p:sp>
-        <p:nvSpPr>
-          <p:cNvPr id="50" name="テキスト ボックス 17">
-            <a:extLst>
-              <a:ext uri="{FF2B5EF4-FFF2-40B4-BE49-F238E27FC236}">
-                <a16:creationId xmlns:a16="http://schemas.microsoft.com/office/drawing/2014/main" id="{788EA624-1D7F-414C-A453-8D3BE27DBED5}"/>
-              </a:ext>
-            </a:extLst>
-          </p:cNvPr>
-          <p:cNvSpPr txBox="1"/>
-          <p:nvPr/>
-        </p:nvSpPr>
-        <p:spPr>
-          <a:xfrm>
-            <a:off x="8263639" y="5451257"/>
-            <a:ext cx="3742624" cy="369332"/>
-          </a:xfrm>
-          <a:prstGeom prst="rect">
-            <a:avLst/>
-          </a:prstGeom>
-          <a:noFill/>
-        </p:spPr>
-        <p:txBody>
-          <a:bodyPr wrap="square" rtlCol="0">
-            <a:spAutoFit/>
-          </a:bodyPr>
-          <a:lstStyle/>
-          <a:p>
-            <a:pPr algn="ctr"/>
-            <a:r>
-              <a:rPr kumimoji="1" lang="en-US" altLang="ja-JP" b="1" dirty="0">
-                <a:latin typeface="Arial" panose="020B0604020202020204" pitchFamily="34" charset="0"/>
-                <a:cs typeface="Arial" panose="020B0604020202020204" pitchFamily="34" charset="0"/>
-              </a:rPr>
-              <a:t>REFERENCES</a:t>
-            </a:r>
-            <a:endParaRPr kumimoji="1" lang="ja-JP" altLang="en-US" b="1" dirty="0">
-              <a:latin typeface="Arial" panose="020B0604020202020204" pitchFamily="34" charset="0"/>
-              <a:cs typeface="Arial" panose="020B0604020202020204" pitchFamily="34" charset="0"/>
-            </a:endParaRPr>
-          </a:p>
-        </p:txBody>
-      </p:sp>
-      <p:sp>
-        <p:nvSpPr>
-          <p:cNvPr id="15" name="TextBox 14">
-            <a:extLst>
-              <a:ext uri="{FF2B5EF4-FFF2-40B4-BE49-F238E27FC236}">
-                <a16:creationId xmlns:a16="http://schemas.microsoft.com/office/drawing/2014/main" id="{03F69A44-084B-6D4D-BB25-BF535E246618}"/>
-              </a:ext>
-            </a:extLst>
-          </p:cNvPr>
-          <p:cNvSpPr txBox="1"/>
-          <p:nvPr/>
-        </p:nvSpPr>
-        <p:spPr>
-          <a:xfrm>
-            <a:off x="243569" y="1704034"/>
-            <a:ext cx="3742624" cy="1708160"/>
+            <a:off x="254955" y="1581489"/>
+            <a:ext cx="3742624" cy="1200329"/>
           </a:xfrm>
           <a:prstGeom prst="rect">
             <a:avLst/>
@@ -4310,7 +4182,7 @@
           <a:p>
             <a:pPr algn="just"/>
             <a:r>
-              <a:rPr lang="en-ZA" sz="1500" dirty="0">
+              <a:rPr lang="en-ZA" sz="1200" dirty="0">
                 <a:latin typeface="Arial" panose="020B0604020202020204" pitchFamily="34" charset="0"/>
                 <a:cs typeface="Arial" panose="020B0604020202020204" pitchFamily="34" charset="0"/>
               </a:rPr>
@@ -4319,7 +4191,7 @@
           </a:p>
           <a:p>
             <a:pPr algn="just"/>
-            <a:endParaRPr lang="en-ZA" sz="1500" dirty="0">
+            <a:endParaRPr lang="en-ZA" sz="1200" dirty="0">
               <a:latin typeface="Arial" panose="020B0604020202020204" pitchFamily="34" charset="0"/>
               <a:cs typeface="Arial" panose="020B0604020202020204" pitchFamily="34" charset="0"/>
             </a:endParaRPr>
@@ -4327,7 +4199,7 @@
           <a:p>
             <a:pPr algn="just"/>
             <a:r>
-              <a:rPr lang="en-ZA" sz="1500" dirty="0">
+              <a:rPr lang="en-ZA" sz="1200" dirty="0">
                 <a:latin typeface="Arial" panose="020B0604020202020204" pitchFamily="34" charset="0"/>
                 <a:cs typeface="Arial" panose="020B0604020202020204" pitchFamily="34" charset="0"/>
               </a:rPr>
@@ -4350,8 +4222,8 @@
         </p:nvSpPr>
         <p:spPr>
           <a:xfrm>
-            <a:off x="257876" y="4073691"/>
-            <a:ext cx="3742624" cy="2400657"/>
+            <a:off x="254955" y="3915673"/>
+            <a:ext cx="3742624" cy="1938992"/>
           </a:xfrm>
           <a:prstGeom prst="rect">
             <a:avLst/>
@@ -4371,7 +4243,7 @@
           <a:p>
             <a:pPr algn="just"/>
             <a:r>
-              <a:rPr lang="en-ZA" sz="1500" dirty="0">
+              <a:rPr lang="en-ZA" sz="1200" dirty="0">
                 <a:latin typeface="Arial" panose="020B0604020202020204" pitchFamily="34" charset="0"/>
                 <a:cs typeface="Arial" panose="020B0604020202020204" pitchFamily="34" charset="0"/>
               </a:rPr>
@@ -4380,7 +4252,7 @@
           </a:p>
           <a:p>
             <a:pPr algn="just"/>
-            <a:endParaRPr lang="en-ZA" sz="1500" dirty="0">
+            <a:endParaRPr lang="en-ZA" sz="1200" dirty="0">
               <a:latin typeface="Arial" panose="020B0604020202020204" pitchFamily="34" charset="0"/>
               <a:cs typeface="Arial" panose="020B0604020202020204" pitchFamily="34" charset="0"/>
             </a:endParaRPr>
@@ -4388,13 +4260,27 @@
           <a:p>
             <a:pPr algn="just"/>
             <a:r>
-              <a:rPr lang="en-ZA" sz="1500" dirty="0">
+              <a:rPr lang="en-ZA" sz="1200" dirty="0">
                 <a:latin typeface="Arial" panose="020B0604020202020204" pitchFamily="34" charset="0"/>
                 <a:cs typeface="Arial" panose="020B0604020202020204" pitchFamily="34" charset="0"/>
               </a:rPr>
-              <a:t>Two sets of neural networks will be trained. The first will predict the systolic (SBP), diastolic (DBP) and mean arterial pressure (MAP). The second will predict the shape of the ABP waveform.</a:t>
-            </a:r>
-            <a:endParaRPr lang="en-US" sz="1500" dirty="0">
+              <a:t>Two sets of machine learning models will be trained. The first will predict the systolic (SBP), diastolic (DBP) and mean arterial pressure (MAP). The second will predict the shape of the ABP waveform. In both, extracted features and the full waveform will be explored as inputs to </a:t>
+            </a:r>
+            <a:r>
+              <a:rPr lang="en-ZA" sz="1200">
+                <a:latin typeface="Arial" panose="020B0604020202020204" pitchFamily="34" charset="0"/>
+                <a:cs typeface="Arial" panose="020B0604020202020204" pitchFamily="34" charset="0"/>
+              </a:rPr>
+              <a:t>the models</a:t>
+            </a:r>
+            <a:r>
+              <a:rPr lang="en-ZA" sz="1200" dirty="0">
+                <a:latin typeface="Arial" panose="020B0604020202020204" pitchFamily="34" charset="0"/>
+                <a:cs typeface="Arial" panose="020B0604020202020204" pitchFamily="34" charset="0"/>
+              </a:rPr>
+              <a:t>.</a:t>
+            </a:r>
+            <a:endParaRPr lang="en-US" sz="1200" dirty="0">
               <a:latin typeface="Arial" panose="020B0604020202020204" pitchFamily="34" charset="0"/>
               <a:cs typeface="Arial" panose="020B0604020202020204" pitchFamily="34" charset="0"/>
             </a:endParaRPr>
@@ -4415,8 +4301,8 @@
         </p:nvSpPr>
         <p:spPr>
           <a:xfrm>
-            <a:off x="4238780" y="1729049"/>
-            <a:ext cx="3742624" cy="1015663"/>
+            <a:off x="4219146" y="1590245"/>
+            <a:ext cx="3742624" cy="830997"/>
           </a:xfrm>
           <a:prstGeom prst="rect">
             <a:avLst/>
@@ -4436,7 +4322,7 @@
           <a:p>
             <a:pPr algn="just"/>
             <a:r>
-              <a:rPr lang="en-ZA" sz="1500" dirty="0">
+              <a:rPr lang="en-ZA" sz="1200" dirty="0">
                 <a:latin typeface="Arial" panose="020B0604020202020204" pitchFamily="34" charset="0"/>
                 <a:cs typeface="Arial" panose="020B0604020202020204" pitchFamily="34" charset="0"/>
               </a:rPr>
@@ -4609,7 +4495,7 @@
         <p:spPr>
           <a:xfrm>
             <a:off x="8263639" y="3875353"/>
-            <a:ext cx="3742624" cy="1246495"/>
+            <a:ext cx="3742624" cy="1015663"/>
           </a:xfrm>
           <a:prstGeom prst="rect">
             <a:avLst/>
@@ -4628,7 +4514,7 @@
           <a:lstStyle/>
           <a:p>
             <a:r>
-              <a:rPr lang="en-ZA" sz="1500" dirty="0">
+              <a:rPr lang="en-ZA" sz="1200" dirty="0">
                 <a:latin typeface="Arial" panose="020B0604020202020204" pitchFamily="34" charset="0"/>
                 <a:cs typeface="Arial" panose="020B0604020202020204" pitchFamily="34" charset="0"/>
               </a:rPr>
@@ -4637,13 +4523,13 @@
           </a:p>
           <a:p>
             <a:r>
-              <a:rPr lang="en-ZA" sz="1500" dirty="0">
+              <a:rPr lang="en-ZA" sz="1200" dirty="0">
                 <a:latin typeface="Arial" panose="020B0604020202020204" pitchFamily="34" charset="0"/>
                 <a:cs typeface="Arial" panose="020B0604020202020204" pitchFamily="34" charset="0"/>
               </a:rPr>
               <a:t> … 1 more line …</a:t>
             </a:r>
-            <a:endParaRPr lang="en-US" sz="1500" dirty="0">
+            <a:endParaRPr lang="en-US" sz="1200" dirty="0">
               <a:latin typeface="Arial" panose="020B0604020202020204" pitchFamily="34" charset="0"/>
               <a:cs typeface="Arial" panose="020B0604020202020204" pitchFamily="34" charset="0"/>
             </a:endParaRPr>
@@ -4664,8 +4550,8 @@
         </p:nvSpPr>
         <p:spPr>
           <a:xfrm>
-            <a:off x="8263639" y="1745173"/>
-            <a:ext cx="3742624" cy="553998"/>
+            <a:off x="8236953" y="1606367"/>
+            <a:ext cx="3742624" cy="461665"/>
           </a:xfrm>
           <a:prstGeom prst="rect">
             <a:avLst/>
@@ -4684,13 +4570,13 @@
           <a:lstStyle/>
           <a:p>
             <a:r>
-              <a:rPr lang="en-ZA" sz="1500" dirty="0">
+              <a:rPr lang="en-ZA" sz="1200" dirty="0">
                 <a:latin typeface="Arial" panose="020B0604020202020204" pitchFamily="34" charset="0"/>
                 <a:cs typeface="Arial" panose="020B0604020202020204" pitchFamily="34" charset="0"/>
               </a:rPr>
               <a:t>We could reduce this section or omit it to make space for more results</a:t>
             </a:r>
-            <a:endParaRPr lang="en-US" sz="1500" dirty="0">
+            <a:endParaRPr lang="en-US" sz="1200" dirty="0">
               <a:latin typeface="Arial" panose="020B0604020202020204" pitchFamily="34" charset="0"/>
               <a:cs typeface="Arial" panose="020B0604020202020204" pitchFamily="34" charset="0"/>
             </a:endParaRPr>
@@ -4711,8 +4597,8 @@
         </p:nvSpPr>
         <p:spPr>
           <a:xfrm>
-            <a:off x="394629" y="1167594"/>
-            <a:ext cx="3420093" cy="411798"/>
+            <a:off x="638832" y="1188415"/>
+            <a:ext cx="2986949" cy="316036"/>
           </a:xfrm>
           <a:prstGeom prst="roundRect">
             <a:avLst/>
@@ -4743,7 +4629,7 @@
           <a:p>
             <a:pPr algn="ctr"/>
             <a:r>
-              <a:rPr lang="en-US" b="1" dirty="0">
+              <a:rPr lang="en-US" sz="1400" b="1" dirty="0">
                 <a:solidFill>
                   <a:schemeClr val="tx1"/>
                 </a:solidFill>
@@ -4757,193 +4643,19 @@
       </p:sp>
       <p:sp>
         <p:nvSpPr>
-          <p:cNvPr id="57" name="Rounded Rectangle 56">
-            <a:extLst>
-              <a:ext uri="{FF2B5EF4-FFF2-40B4-BE49-F238E27FC236}">
-                <a16:creationId xmlns:a16="http://schemas.microsoft.com/office/drawing/2014/main" id="{000FFB98-E6C5-B444-ABCD-20D2CEAA03DA}"/>
-              </a:ext>
-            </a:extLst>
-          </p:cNvPr>
-          <p:cNvSpPr/>
+          <p:cNvPr id="61" name="TextBox 60">
+            <a:extLst>
+              <a:ext uri="{FF2B5EF4-FFF2-40B4-BE49-F238E27FC236}">
+                <a16:creationId xmlns:a16="http://schemas.microsoft.com/office/drawing/2014/main" id="{06313774-312F-2149-8076-9FD8BF752B89}"/>
+              </a:ext>
+            </a:extLst>
+          </p:cNvPr>
+          <p:cNvSpPr txBox="1"/>
           <p:nvPr/>
         </p:nvSpPr>
         <p:spPr>
           <a:xfrm>
-            <a:off x="419141" y="3542123"/>
-            <a:ext cx="3420093" cy="411798"/>
-          </a:xfrm>
-          <a:prstGeom prst="roundRect">
-            <a:avLst/>
-          </a:prstGeom>
-          <a:solidFill>
-            <a:srgbClr val="849DAB"/>
-          </a:solidFill>
-        </p:spPr>
-        <p:style>
-          <a:lnRef idx="2">
-            <a:schemeClr val="accent1">
-              <a:shade val="50000"/>
-            </a:schemeClr>
-          </a:lnRef>
-          <a:fillRef idx="1">
-            <a:schemeClr val="accent1"/>
-          </a:fillRef>
-          <a:effectRef idx="0">
-            <a:schemeClr val="accent1"/>
-          </a:effectRef>
-          <a:fontRef idx="minor">
-            <a:schemeClr val="lt1"/>
-          </a:fontRef>
-        </p:style>
-        <p:txBody>
-          <a:bodyPr rtlCol="0" anchor="ctr"/>
-          <a:lstStyle/>
-          <a:p>
-            <a:pPr algn="ctr"/>
-            <a:r>
-              <a:rPr lang="en-US" b="1" dirty="0">
-                <a:solidFill>
-                  <a:schemeClr val="tx1"/>
-                </a:solidFill>
-                <a:latin typeface="Arial" panose="020B0604020202020204" pitchFamily="34" charset="0"/>
-                <a:cs typeface="Arial" panose="020B0604020202020204" pitchFamily="34" charset="0"/>
-              </a:rPr>
-              <a:t>METHOD</a:t>
-            </a:r>
-          </a:p>
-        </p:txBody>
-      </p:sp>
-      <p:sp>
-        <p:nvSpPr>
-          <p:cNvPr id="58" name="Rounded Rectangle 57">
-            <a:extLst>
-              <a:ext uri="{FF2B5EF4-FFF2-40B4-BE49-F238E27FC236}">
-                <a16:creationId xmlns:a16="http://schemas.microsoft.com/office/drawing/2014/main" id="{92C8B685-78EF-DC43-BA77-3934542AFAC6}"/>
-              </a:ext>
-            </a:extLst>
-          </p:cNvPr>
-          <p:cNvSpPr/>
-          <p:nvPr/>
-        </p:nvSpPr>
-        <p:spPr>
-          <a:xfrm>
-            <a:off x="4409767" y="1177757"/>
-            <a:ext cx="3420093" cy="411798"/>
-          </a:xfrm>
-          <a:prstGeom prst="roundRect">
-            <a:avLst/>
-          </a:prstGeom>
-          <a:solidFill>
-            <a:srgbClr val="849DAB"/>
-          </a:solidFill>
-        </p:spPr>
-        <p:style>
-          <a:lnRef idx="2">
-            <a:schemeClr val="accent1">
-              <a:shade val="50000"/>
-            </a:schemeClr>
-          </a:lnRef>
-          <a:fillRef idx="1">
-            <a:schemeClr val="accent1"/>
-          </a:fillRef>
-          <a:effectRef idx="0">
-            <a:schemeClr val="accent1"/>
-          </a:effectRef>
-          <a:fontRef idx="minor">
-            <a:schemeClr val="lt1"/>
-          </a:fontRef>
-        </p:style>
-        <p:txBody>
-          <a:bodyPr rtlCol="0" anchor="ctr"/>
-          <a:lstStyle/>
-          <a:p>
-            <a:pPr algn="ctr"/>
-            <a:r>
-              <a:rPr lang="en-US" b="1" dirty="0">
-                <a:solidFill>
-                  <a:schemeClr val="tx1"/>
-                </a:solidFill>
-                <a:latin typeface="Arial" panose="020B0604020202020204" pitchFamily="34" charset="0"/>
-                <a:cs typeface="Arial" panose="020B0604020202020204" pitchFamily="34" charset="0"/>
-              </a:rPr>
-              <a:t>RESULTS</a:t>
-            </a:r>
-          </a:p>
-        </p:txBody>
-      </p:sp>
-      <p:sp>
-        <p:nvSpPr>
-          <p:cNvPr id="59" name="Rounded Rectangle 58">
-            <a:extLst>
-              <a:ext uri="{FF2B5EF4-FFF2-40B4-BE49-F238E27FC236}">
-                <a16:creationId xmlns:a16="http://schemas.microsoft.com/office/drawing/2014/main" id="{0FA1784F-51AC-7C42-A5C9-E1F904414FBC}"/>
-              </a:ext>
-            </a:extLst>
-          </p:cNvPr>
-          <p:cNvSpPr/>
-          <p:nvPr/>
-        </p:nvSpPr>
-        <p:spPr>
-          <a:xfrm>
-            <a:off x="8334066" y="1177757"/>
-            <a:ext cx="3420093" cy="411798"/>
-          </a:xfrm>
-          <a:prstGeom prst="roundRect">
-            <a:avLst/>
-          </a:prstGeom>
-          <a:solidFill>
-            <a:srgbClr val="849DAB"/>
-          </a:solidFill>
-        </p:spPr>
-        <p:style>
-          <a:lnRef idx="2">
-            <a:schemeClr val="accent1">
-              <a:shade val="50000"/>
-            </a:schemeClr>
-          </a:lnRef>
-          <a:fillRef idx="1">
-            <a:schemeClr val="accent1"/>
-          </a:fillRef>
-          <a:effectRef idx="0">
-            <a:schemeClr val="accent1"/>
-          </a:effectRef>
-          <a:fontRef idx="minor">
-            <a:schemeClr val="lt1"/>
-          </a:fontRef>
-        </p:style>
-        <p:txBody>
-          <a:bodyPr rtlCol="0" anchor="ctr"/>
-          <a:lstStyle/>
-          <a:p>
-            <a:pPr algn="ctr"/>
-            <a:r>
-              <a:rPr lang="en-US" b="1" dirty="0">
-                <a:solidFill>
-                  <a:schemeClr val="tx1"/>
-                </a:solidFill>
-                <a:latin typeface="Arial" panose="020B0604020202020204" pitchFamily="34" charset="0"/>
-                <a:cs typeface="Arial" panose="020B0604020202020204" pitchFamily="34" charset="0"/>
-              </a:rPr>
-              <a:t>HARDWARE</a:t>
-            </a:r>
-          </a:p>
-        </p:txBody>
-      </p:sp>
-      <p:sp>
-        <p:nvSpPr>
-          <p:cNvPr id="61" name="TextBox 60">
-            <a:extLst>
-              <a:ext uri="{FF2B5EF4-FFF2-40B4-BE49-F238E27FC236}">
-                <a16:creationId xmlns:a16="http://schemas.microsoft.com/office/drawing/2014/main" id="{06313774-312F-2149-8076-9FD8BF752B89}"/>
-              </a:ext>
-            </a:extLst>
-          </p:cNvPr>
-          <p:cNvSpPr txBox="1"/>
-          <p:nvPr/>
-        </p:nvSpPr>
-        <p:spPr>
-          <a:xfrm>
-            <a:off x="4224688" y="4690939"/>
+            <a:off x="4180125" y="4498600"/>
             <a:ext cx="3742624" cy="323165"/>
           </a:xfrm>
           <a:prstGeom prst="rect">
@@ -4987,14 +4699,14 @@
           <p:nvPr>
             <p:extLst>
               <p:ext uri="{D42A27DB-BD31-4B8C-83A1-F6EECF244321}">
-                <p14:modId xmlns:p14="http://schemas.microsoft.com/office/powerpoint/2010/main" val="1303204144"/>
+                <p14:modId xmlns:p14="http://schemas.microsoft.com/office/powerpoint/2010/main" val="1554242003"/>
               </p:ext>
             </p:extLst>
           </p:nvPr>
         </p:nvGraphicFramePr>
         <p:xfrm>
           <a:off x="4249682" y="3183305"/>
-          <a:ext cx="3692636" cy="1361440"/>
+          <a:ext cx="3692636" cy="1112520"/>
         </p:xfrm>
         <a:graphic>
           <a:graphicData uri="http://schemas.openxmlformats.org/drawingml/2006/table">
@@ -5039,7 +4751,7 @@
                     <a:lstStyle/>
                     <a:p>
                       <a:pPr algn="ctr"/>
-                      <a:endParaRPr lang="en-US" sz="1400" dirty="0">
+                      <a:endParaRPr lang="en-US" sz="1200" dirty="0">
                         <a:solidFill>
                           <a:schemeClr val="tx1"/>
                         </a:solidFill>
@@ -5048,7 +4760,7 @@
                       </a:endParaRPr>
                     </a:p>
                   </a:txBody>
-                  <a:tcPr>
+                  <a:tcPr anchor="ctr">
                     <a:lnL w="12700" cap="flat" cmpd="sng" algn="ctr">
                       <a:solidFill>
                         <a:schemeClr val="tx1"/>
@@ -5097,7 +4809,7 @@
                     <a:p>
                       <a:pPr algn="ctr"/>
                       <a:r>
-                        <a:rPr lang="en-US" sz="1400" dirty="0">
+                        <a:rPr lang="en-US" sz="1200" dirty="0">
                           <a:solidFill>
                             <a:schemeClr val="tx1"/>
                           </a:solidFill>
@@ -5108,7 +4820,7 @@
                       </a:r>
                     </a:p>
                   </a:txBody>
-                  <a:tcPr>
+                  <a:tcPr anchor="ctr">
                     <a:lnL w="12700" cap="flat" cmpd="sng" algn="ctr">
                       <a:solidFill>
                         <a:schemeClr val="tx1"/>
@@ -5157,7 +4869,7 @@
                     <a:p>
                       <a:pPr algn="ctr"/>
                       <a:r>
-                        <a:rPr lang="en-US" sz="1400" dirty="0">
+                        <a:rPr lang="en-US" sz="1200" dirty="0">
                           <a:solidFill>
                             <a:schemeClr val="tx1"/>
                           </a:solidFill>
@@ -5168,7 +4880,7 @@
                       </a:r>
                     </a:p>
                   </a:txBody>
-                  <a:tcPr>
+                  <a:tcPr anchor="ctr">
                     <a:lnL w="12700" cap="flat" cmpd="sng" algn="ctr">
                       <a:solidFill>
                         <a:schemeClr val="tx1"/>
@@ -5217,7 +4929,7 @@
                     <a:p>
                       <a:pPr algn="ctr"/>
                       <a:r>
-                        <a:rPr lang="en-US" sz="1400" dirty="0">
+                        <a:rPr lang="en-US" sz="1200" dirty="0">
                           <a:solidFill>
                             <a:schemeClr val="tx1"/>
                           </a:solidFill>
@@ -5228,7 +4940,7 @@
                       </a:r>
                     </a:p>
                   </a:txBody>
-                  <a:tcPr>
+                  <a:tcPr anchor="ctr">
                     <a:lnL w="12700" cap="flat" cmpd="sng" algn="ctr">
                       <a:solidFill>
                         <a:schemeClr val="tx1"/>
@@ -5283,7 +4995,7 @@
                     <a:lstStyle/>
                     <a:p>
                       <a:r>
-                        <a:rPr lang="en-US" sz="1300" dirty="0">
+                        <a:rPr lang="en-US" sz="1200" dirty="0">
                           <a:solidFill>
                             <a:schemeClr val="tx1"/>
                           </a:solidFill>
@@ -5294,7 +5006,7 @@
                       </a:r>
                     </a:p>
                   </a:txBody>
-                  <a:tcPr>
+                  <a:tcPr anchor="ctr">
                     <a:lnL w="12700" cap="flat" cmpd="sng" algn="ctr">
                       <a:solidFill>
                         <a:schemeClr val="tx1"/>
@@ -5341,7 +5053,7 @@
                     <a:p>
                       <a:pPr algn="ctr"/>
                       <a:r>
-                        <a:rPr lang="en-US" sz="1400" dirty="0">
+                        <a:rPr lang="en-US" sz="1200" dirty="0">
                           <a:solidFill>
                             <a:schemeClr val="tx1"/>
                           </a:solidFill>
@@ -5352,7 +5064,7 @@
                       </a:r>
                     </a:p>
                   </a:txBody>
-                  <a:tcPr>
+                  <a:tcPr anchor="ctr">
                     <a:lnL w="12700" cap="flat" cmpd="sng" algn="ctr">
                       <a:solidFill>
                         <a:schemeClr val="tx1"/>
@@ -5399,7 +5111,7 @@
                     <a:p>
                       <a:pPr algn="ctr"/>
                       <a:r>
-                        <a:rPr lang="en-US" sz="1400" dirty="0">
+                        <a:rPr lang="en-US" sz="1200" dirty="0">
                           <a:solidFill>
                             <a:schemeClr val="tx1"/>
                           </a:solidFill>
@@ -5410,7 +5122,7 @@
                       </a:r>
                     </a:p>
                   </a:txBody>
-                  <a:tcPr>
+                  <a:tcPr anchor="ctr">
                     <a:lnL w="12700" cap="flat" cmpd="sng" algn="ctr">
                       <a:solidFill>
                         <a:schemeClr val="tx1"/>
@@ -5457,7 +5169,7 @@
                     <a:p>
                       <a:pPr algn="ctr"/>
                       <a:r>
-                        <a:rPr lang="en-US" sz="1400" dirty="0">
+                        <a:rPr lang="en-US" sz="1200" dirty="0">
                           <a:solidFill>
                             <a:schemeClr val="tx1"/>
                           </a:solidFill>
@@ -5468,7 +5180,7 @@
                       </a:r>
                     </a:p>
                   </a:txBody>
-                  <a:tcPr>
+                  <a:tcPr anchor="ctr">
                     <a:lnL w="12700" cap="flat" cmpd="sng" algn="ctr">
                       <a:solidFill>
                         <a:schemeClr val="tx1"/>
@@ -5521,7 +5233,7 @@
                     <a:lstStyle/>
                     <a:p>
                       <a:r>
-                        <a:rPr lang="en-US" sz="1300" dirty="0">
+                        <a:rPr lang="en-US" sz="1200" dirty="0">
                           <a:solidFill>
                             <a:schemeClr val="tx1"/>
                           </a:solidFill>
@@ -5531,7 +5243,7 @@
                         <a:t>R</a:t>
                       </a:r>
                       <a:r>
-                        <a:rPr lang="en-US" sz="1300" baseline="30000" dirty="0">
+                        <a:rPr lang="en-US" sz="1200" baseline="30000" dirty="0">
                           <a:solidFill>
                             <a:schemeClr val="tx1"/>
                           </a:solidFill>
@@ -5541,53 +5253,8 @@
                         <a:t>2</a:t>
                       </a:r>
                     </a:p>
-                    <a:p>
-                      <a:endParaRPr lang="en-US" sz="1300" baseline="30000" dirty="0">
-                        <a:solidFill>
-                          <a:schemeClr val="tx1"/>
-                        </a:solidFill>
-                        <a:latin typeface="Arial" panose="020B0604020202020204" pitchFamily="34" charset="0"/>
-                        <a:cs typeface="Arial" panose="020B0604020202020204" pitchFamily="34" charset="0"/>
-                      </a:endParaRPr>
-                    </a:p>
-                    <a:p>
-                      <a:pPr marL="0" marR="0" lvl="0" indent="0" algn="l" defTabSz="914400" rtl="0" eaLnBrk="1" fontAlgn="auto" latinLnBrk="0" hangingPunct="1">
-                        <a:lnSpc>
-                          <a:spcPct val="100000"/>
-                        </a:lnSpc>
-                        <a:spcBef>
-                          <a:spcPts val="0"/>
-                        </a:spcBef>
-                        <a:spcAft>
-                          <a:spcPts val="0"/>
-                        </a:spcAft>
-                        <a:buClrTx/>
-                        <a:buSzTx/>
-                        <a:buFontTx/>
-                        <a:buNone/>
-                        <a:tabLst/>
-                        <a:defRPr/>
-                      </a:pPr>
-                      <a:r>
-                        <a:rPr lang="en-US" sz="1300" dirty="0">
-                          <a:solidFill>
-                            <a:schemeClr val="tx1"/>
-                          </a:solidFill>
-                          <a:latin typeface="Arial" panose="020B0604020202020204" pitchFamily="34" charset="0"/>
-                          <a:cs typeface="Arial" panose="020B0604020202020204" pitchFamily="34" charset="0"/>
-                        </a:rPr>
-                        <a:t>% &lt; 10mmHg</a:t>
-                      </a:r>
-                      <a:endParaRPr lang="en-US" sz="1300" baseline="30000" dirty="0">
-                        <a:solidFill>
-                          <a:schemeClr val="tx1"/>
-                        </a:solidFill>
-                        <a:latin typeface="Arial" panose="020B0604020202020204" pitchFamily="34" charset="0"/>
-                        <a:cs typeface="Arial" panose="020B0604020202020204" pitchFamily="34" charset="0"/>
-                      </a:endParaRPr>
-                    </a:p>
                   </a:txBody>
-                  <a:tcPr>
+                  <a:tcPr anchor="ctr">
                     <a:lnL w="12700" cap="flat" cmpd="sng" algn="ctr">
                       <a:solidFill>
                         <a:schemeClr val="tx1"/>
@@ -5634,7 +5301,7 @@
                     <a:p>
                       <a:pPr algn="ctr"/>
                       <a:r>
-                        <a:rPr lang="en-US" sz="1400" dirty="0">
+                        <a:rPr lang="en-US" sz="1200" dirty="0">
                           <a:solidFill>
                             <a:schemeClr val="tx1"/>
                           </a:solidFill>
@@ -5645,7 +5312,7 @@
                       </a:r>
                     </a:p>
                   </a:txBody>
-                  <a:tcPr>
+                  <a:tcPr anchor="ctr">
                     <a:lnL w="12700" cap="flat" cmpd="sng" algn="ctr">
                       <a:solidFill>
                         <a:schemeClr val="tx1"/>
@@ -5692,7 +5359,7 @@
                     <a:p>
                       <a:pPr algn="ctr"/>
                       <a:r>
-                        <a:rPr lang="en-US" sz="1400" dirty="0">
+                        <a:rPr lang="en-US" sz="1200" dirty="0">
                           <a:solidFill>
                             <a:schemeClr val="tx1"/>
                           </a:solidFill>
@@ -5703,7 +5370,7 @@
                       </a:r>
                     </a:p>
                   </a:txBody>
-                  <a:tcPr>
+                  <a:tcPr anchor="ctr">
                     <a:lnL w="12700" cap="flat" cmpd="sng" algn="ctr">
                       <a:solidFill>
                         <a:schemeClr val="tx1"/>
@@ -5750,7 +5417,7 @@
                     <a:p>
                       <a:pPr algn="ctr"/>
                       <a:r>
-                        <a:rPr lang="en-US" sz="1400" dirty="0">
+                        <a:rPr lang="en-US" sz="1200" dirty="0">
                           <a:solidFill>
                             <a:schemeClr val="tx1"/>
                           </a:solidFill>
@@ -5760,18 +5427,8 @@
                         <a:t>0.623</a:t>
                       </a:r>
                     </a:p>
-                    <a:p>
-                      <a:pPr algn="ctr"/>
-                      <a:endParaRPr lang="en-US" sz="1400" dirty="0">
-                        <a:solidFill>
-                          <a:schemeClr val="tx1"/>
-                        </a:solidFill>
-                        <a:latin typeface="Arial" panose="020B0604020202020204" pitchFamily="34" charset="0"/>
-                        <a:cs typeface="Arial" panose="020B0604020202020204" pitchFamily="34" charset="0"/>
-                      </a:endParaRPr>
-                    </a:p>
                   </a:txBody>
-                  <a:tcPr>
+                  <a:tcPr anchor="ctr">
                     <a:lnL w="12700" cap="flat" cmpd="sng" algn="ctr">
                       <a:solidFill>
                         <a:schemeClr val="tx1"/>
@@ -5836,7 +5493,7 @@
         <p:spPr>
           <a:xfrm>
             <a:off x="4238780" y="2875528"/>
-            <a:ext cx="3742624" cy="307777"/>
+            <a:ext cx="3742624" cy="276999"/>
           </a:xfrm>
           <a:prstGeom prst="rect">
             <a:avLst/>
@@ -5853,11 +5510,301 @@
           <a:lstStyle/>
           <a:p>
             <a:r>
-              <a:rPr lang="en-ZA" sz="1400" u="sng" dirty="0">
+              <a:rPr lang="en-ZA" sz="1200" u="sng" dirty="0">
                 <a:latin typeface="Arial" panose="020B0604020202020204" pitchFamily="34" charset="0"/>
                 <a:cs typeface="Arial" panose="020B0604020202020204" pitchFamily="34" charset="0"/>
               </a:rPr>
-              <a:t>Table 1: Discrete Blood Pressure Prediction</a:t>
+              <a:t>Table 1: Discrete Blood Pressure Prediction Results</a:t>
+            </a:r>
+          </a:p>
+        </p:txBody>
+      </p:sp>
+      <p:sp>
+        <p:nvSpPr>
+          <p:cNvPr id="63" name="Rounded Rectangle 62">
+            <a:extLst>
+              <a:ext uri="{FF2B5EF4-FFF2-40B4-BE49-F238E27FC236}">
+                <a16:creationId xmlns:a16="http://schemas.microsoft.com/office/drawing/2014/main" id="{956A5D88-1140-FE4D-A9BE-AAE1ADE0308E}"/>
+              </a:ext>
+            </a:extLst>
+          </p:cNvPr>
+          <p:cNvSpPr/>
+          <p:nvPr/>
+        </p:nvSpPr>
+        <p:spPr>
+          <a:xfrm>
+            <a:off x="590260" y="3485223"/>
+            <a:ext cx="2986949" cy="316036"/>
+          </a:xfrm>
+          <a:prstGeom prst="roundRect">
+            <a:avLst/>
+          </a:prstGeom>
+          <a:solidFill>
+            <a:srgbClr val="849DAB"/>
+          </a:solidFill>
+        </p:spPr>
+        <p:style>
+          <a:lnRef idx="2">
+            <a:schemeClr val="accent1">
+              <a:shade val="50000"/>
+            </a:schemeClr>
+          </a:lnRef>
+          <a:fillRef idx="1">
+            <a:schemeClr val="accent1"/>
+          </a:fillRef>
+          <a:effectRef idx="0">
+            <a:schemeClr val="accent1"/>
+          </a:effectRef>
+          <a:fontRef idx="minor">
+            <a:schemeClr val="lt1"/>
+          </a:fontRef>
+        </p:style>
+        <p:txBody>
+          <a:bodyPr rtlCol="0" anchor="ctr"/>
+          <a:lstStyle/>
+          <a:p>
+            <a:pPr algn="ctr"/>
+            <a:r>
+              <a:rPr lang="en-US" sz="1400" b="1" dirty="0">
+                <a:solidFill>
+                  <a:schemeClr val="tx1"/>
+                </a:solidFill>
+                <a:latin typeface="Arial" panose="020B0604020202020204" pitchFamily="34" charset="0"/>
+                <a:cs typeface="Arial" panose="020B0604020202020204" pitchFamily="34" charset="0"/>
+              </a:rPr>
+              <a:t>METHOD</a:t>
+            </a:r>
+          </a:p>
+        </p:txBody>
+      </p:sp>
+      <p:sp>
+        <p:nvSpPr>
+          <p:cNvPr id="64" name="Rounded Rectangle 63">
+            <a:extLst>
+              <a:ext uri="{FF2B5EF4-FFF2-40B4-BE49-F238E27FC236}">
+                <a16:creationId xmlns:a16="http://schemas.microsoft.com/office/drawing/2014/main" id="{1DBAE2F8-563C-C848-95F6-93D1D23F28ED}"/>
+              </a:ext>
+            </a:extLst>
+          </p:cNvPr>
+          <p:cNvSpPr/>
+          <p:nvPr/>
+        </p:nvSpPr>
+        <p:spPr>
+          <a:xfrm>
+            <a:off x="4602525" y="1203845"/>
+            <a:ext cx="2986949" cy="316036"/>
+          </a:xfrm>
+          <a:prstGeom prst="roundRect">
+            <a:avLst/>
+          </a:prstGeom>
+          <a:solidFill>
+            <a:srgbClr val="849DAB"/>
+          </a:solidFill>
+        </p:spPr>
+        <p:style>
+          <a:lnRef idx="2">
+            <a:schemeClr val="accent1">
+              <a:shade val="50000"/>
+            </a:schemeClr>
+          </a:lnRef>
+          <a:fillRef idx="1">
+            <a:schemeClr val="accent1"/>
+          </a:fillRef>
+          <a:effectRef idx="0">
+            <a:schemeClr val="accent1"/>
+          </a:effectRef>
+          <a:fontRef idx="minor">
+            <a:schemeClr val="lt1"/>
+          </a:fontRef>
+        </p:style>
+        <p:txBody>
+          <a:bodyPr rtlCol="0" anchor="ctr"/>
+          <a:lstStyle/>
+          <a:p>
+            <a:pPr algn="ctr"/>
+            <a:r>
+              <a:rPr lang="en-US" sz="1400" b="1" dirty="0">
+                <a:solidFill>
+                  <a:schemeClr val="tx1"/>
+                </a:solidFill>
+                <a:latin typeface="Arial" panose="020B0604020202020204" pitchFamily="34" charset="0"/>
+                <a:cs typeface="Arial" panose="020B0604020202020204" pitchFamily="34" charset="0"/>
+              </a:rPr>
+              <a:t>RESULTS</a:t>
+            </a:r>
+          </a:p>
+        </p:txBody>
+      </p:sp>
+      <p:sp>
+        <p:nvSpPr>
+          <p:cNvPr id="65" name="Rounded Rectangle 64">
+            <a:extLst>
+              <a:ext uri="{FF2B5EF4-FFF2-40B4-BE49-F238E27FC236}">
+                <a16:creationId xmlns:a16="http://schemas.microsoft.com/office/drawing/2014/main" id="{8DAC1066-3E7E-D543-9E1F-B63AD191E146}"/>
+              </a:ext>
+            </a:extLst>
+          </p:cNvPr>
+          <p:cNvSpPr/>
+          <p:nvPr/>
+        </p:nvSpPr>
+        <p:spPr>
+          <a:xfrm>
+            <a:off x="8641476" y="1203845"/>
+            <a:ext cx="2986949" cy="316036"/>
+          </a:xfrm>
+          <a:prstGeom prst="roundRect">
+            <a:avLst/>
+          </a:prstGeom>
+          <a:solidFill>
+            <a:srgbClr val="849DAB"/>
+          </a:solidFill>
+        </p:spPr>
+        <p:style>
+          <a:lnRef idx="2">
+            <a:schemeClr val="accent1">
+              <a:shade val="50000"/>
+            </a:schemeClr>
+          </a:lnRef>
+          <a:fillRef idx="1">
+            <a:schemeClr val="accent1"/>
+          </a:fillRef>
+          <a:effectRef idx="0">
+            <a:schemeClr val="accent1"/>
+          </a:effectRef>
+          <a:fontRef idx="minor">
+            <a:schemeClr val="lt1"/>
+          </a:fontRef>
+        </p:style>
+        <p:txBody>
+          <a:bodyPr rtlCol="0" anchor="ctr"/>
+          <a:lstStyle/>
+          <a:p>
+            <a:pPr algn="ctr"/>
+            <a:r>
+              <a:rPr lang="en-US" sz="1400" b="1" dirty="0">
+                <a:solidFill>
+                  <a:schemeClr val="tx1"/>
+                </a:solidFill>
+                <a:latin typeface="Arial" panose="020B0604020202020204" pitchFamily="34" charset="0"/>
+                <a:cs typeface="Arial" panose="020B0604020202020204" pitchFamily="34" charset="0"/>
+              </a:rPr>
+              <a:t>HARDWARE</a:t>
+            </a:r>
+          </a:p>
+        </p:txBody>
+      </p:sp>
+      <p:sp>
+        <p:nvSpPr>
+          <p:cNvPr id="66" name="Rounded Rectangle 65">
+            <a:extLst>
+              <a:ext uri="{FF2B5EF4-FFF2-40B4-BE49-F238E27FC236}">
+                <a16:creationId xmlns:a16="http://schemas.microsoft.com/office/drawing/2014/main" id="{19D655D8-1896-944B-8A48-F4C546951428}"/>
+              </a:ext>
+            </a:extLst>
+          </p:cNvPr>
+          <p:cNvSpPr/>
+          <p:nvPr/>
+        </p:nvSpPr>
+        <p:spPr>
+          <a:xfrm>
+            <a:off x="8614791" y="3474689"/>
+            <a:ext cx="2986949" cy="316036"/>
+          </a:xfrm>
+          <a:prstGeom prst="roundRect">
+            <a:avLst/>
+          </a:prstGeom>
+          <a:solidFill>
+            <a:srgbClr val="849DAB"/>
+          </a:solidFill>
+        </p:spPr>
+        <p:style>
+          <a:lnRef idx="2">
+            <a:schemeClr val="accent1">
+              <a:shade val="50000"/>
+            </a:schemeClr>
+          </a:lnRef>
+          <a:fillRef idx="1">
+            <a:schemeClr val="accent1"/>
+          </a:fillRef>
+          <a:effectRef idx="0">
+            <a:schemeClr val="accent1"/>
+          </a:effectRef>
+          <a:fontRef idx="minor">
+            <a:schemeClr val="lt1"/>
+          </a:fontRef>
+        </p:style>
+        <p:txBody>
+          <a:bodyPr rtlCol="0" anchor="ctr"/>
+          <a:lstStyle/>
+          <a:p>
+            <a:pPr algn="ctr"/>
+            <a:r>
+              <a:rPr lang="en-US" sz="1400" b="1" dirty="0">
+                <a:solidFill>
+                  <a:schemeClr val="tx1"/>
+                </a:solidFill>
+                <a:latin typeface="Arial" panose="020B0604020202020204" pitchFamily="34" charset="0"/>
+                <a:cs typeface="Arial" panose="020B0604020202020204" pitchFamily="34" charset="0"/>
+              </a:rPr>
+              <a:t>CONCLUSION</a:t>
+            </a:r>
+          </a:p>
+        </p:txBody>
+      </p:sp>
+      <p:sp>
+        <p:nvSpPr>
+          <p:cNvPr id="67" name="Rounded Rectangle 66">
+            <a:extLst>
+              <a:ext uri="{FF2B5EF4-FFF2-40B4-BE49-F238E27FC236}">
+                <a16:creationId xmlns:a16="http://schemas.microsoft.com/office/drawing/2014/main" id="{C25EBF6D-EA8C-6F4C-BBCD-61E3DB6B2417}"/>
+              </a:ext>
+            </a:extLst>
+          </p:cNvPr>
+          <p:cNvSpPr/>
+          <p:nvPr/>
+        </p:nvSpPr>
+        <p:spPr>
+          <a:xfrm>
+            <a:off x="8641476" y="5485333"/>
+            <a:ext cx="2986949" cy="316036"/>
+          </a:xfrm>
+          <a:prstGeom prst="roundRect">
+            <a:avLst/>
+          </a:prstGeom>
+          <a:solidFill>
+            <a:srgbClr val="849DAB"/>
+          </a:solidFill>
+        </p:spPr>
+        <p:style>
+          <a:lnRef idx="2">
+            <a:schemeClr val="accent1">
+              <a:shade val="50000"/>
+            </a:schemeClr>
+          </a:lnRef>
+          <a:fillRef idx="1">
+            <a:schemeClr val="accent1"/>
+          </a:fillRef>
+          <a:effectRef idx="0">
+            <a:schemeClr val="accent1"/>
+          </a:effectRef>
+          <a:fontRef idx="minor">
+            <a:schemeClr val="lt1"/>
+          </a:fontRef>
+        </p:style>
+        <p:txBody>
+          <a:bodyPr rtlCol="0" anchor="ctr"/>
+          <a:lstStyle/>
+          <a:p>
+            <a:pPr algn="ctr"/>
+            <a:r>
+              <a:rPr lang="en-US" sz="1400" b="1" dirty="0">
+                <a:solidFill>
+                  <a:schemeClr val="tx1"/>
+                </a:solidFill>
+                <a:latin typeface="Arial" panose="020B0604020202020204" pitchFamily="34" charset="0"/>
+                <a:cs typeface="Arial" panose="020B0604020202020204" pitchFamily="34" charset="0"/>
+              </a:rPr>
+              <a:t>REFERENCES</a:t>
             </a:r>
           </a:p>
         </p:txBody>

</xml_diff>